<commit_message>
Cleaned up management meeting protocol, updated project plan with first QA date
</commit_message>
<xml_diff>
--- a/Organization/Project Plan/Project Plan.pptx
+++ b/Organization/Project Plan/Project Plan.pptx
@@ -263,7 +263,7 @@
           <a:p>
             <a:fld id="{FF1351A7-0CC0-49EE-969C-7FA0FB4B6599}" type="datetimeFigureOut">
               <a:rPr lang="en-US" smtClean="0"/>
-              <a:t>4/7/2020</a:t>
+              <a:t>4/10/2020</a:t>
             </a:fld>
             <a:endParaRPr lang="en-US"/>
           </a:p>
@@ -463,7 +463,7 @@
           <a:p>
             <a:fld id="{FF1351A7-0CC0-49EE-969C-7FA0FB4B6599}" type="datetimeFigureOut">
               <a:rPr lang="en-US" smtClean="0"/>
-              <a:t>4/7/2020</a:t>
+              <a:t>4/10/2020</a:t>
             </a:fld>
             <a:endParaRPr lang="en-US"/>
           </a:p>
@@ -673,7 +673,7 @@
           <a:p>
             <a:fld id="{FF1351A7-0CC0-49EE-969C-7FA0FB4B6599}" type="datetimeFigureOut">
               <a:rPr lang="en-US" smtClean="0"/>
-              <a:t>4/7/2020</a:t>
+              <a:t>4/10/2020</a:t>
             </a:fld>
             <a:endParaRPr lang="en-US"/>
           </a:p>
@@ -873,7 +873,7 @@
           <a:p>
             <a:fld id="{FF1351A7-0CC0-49EE-969C-7FA0FB4B6599}" type="datetimeFigureOut">
               <a:rPr lang="en-US" smtClean="0"/>
-              <a:t>4/7/2020</a:t>
+              <a:t>4/10/2020</a:t>
             </a:fld>
             <a:endParaRPr lang="en-US"/>
           </a:p>
@@ -1149,7 +1149,7 @@
           <a:p>
             <a:fld id="{FF1351A7-0CC0-49EE-969C-7FA0FB4B6599}" type="datetimeFigureOut">
               <a:rPr lang="en-US" smtClean="0"/>
-              <a:t>4/7/2020</a:t>
+              <a:t>4/10/2020</a:t>
             </a:fld>
             <a:endParaRPr lang="en-US"/>
           </a:p>
@@ -1417,7 +1417,7 @@
           <a:p>
             <a:fld id="{FF1351A7-0CC0-49EE-969C-7FA0FB4B6599}" type="datetimeFigureOut">
               <a:rPr lang="en-US" smtClean="0"/>
-              <a:t>4/7/2020</a:t>
+              <a:t>4/10/2020</a:t>
             </a:fld>
             <a:endParaRPr lang="en-US"/>
           </a:p>
@@ -1832,7 +1832,7 @@
           <a:p>
             <a:fld id="{FF1351A7-0CC0-49EE-969C-7FA0FB4B6599}" type="datetimeFigureOut">
               <a:rPr lang="en-US" smtClean="0"/>
-              <a:t>4/7/2020</a:t>
+              <a:t>4/10/2020</a:t>
             </a:fld>
             <a:endParaRPr lang="en-US"/>
           </a:p>
@@ -1974,7 +1974,7 @@
           <a:p>
             <a:fld id="{FF1351A7-0CC0-49EE-969C-7FA0FB4B6599}" type="datetimeFigureOut">
               <a:rPr lang="en-US" smtClean="0"/>
-              <a:t>4/7/2020</a:t>
+              <a:t>4/10/2020</a:t>
             </a:fld>
             <a:endParaRPr lang="en-US"/>
           </a:p>
@@ -2087,7 +2087,7 @@
           <a:p>
             <a:fld id="{FF1351A7-0CC0-49EE-969C-7FA0FB4B6599}" type="datetimeFigureOut">
               <a:rPr lang="en-US" smtClean="0"/>
-              <a:t>4/7/2020</a:t>
+              <a:t>4/10/2020</a:t>
             </a:fld>
             <a:endParaRPr lang="en-US"/>
           </a:p>
@@ -2400,7 +2400,7 @@
           <a:p>
             <a:fld id="{FF1351A7-0CC0-49EE-969C-7FA0FB4B6599}" type="datetimeFigureOut">
               <a:rPr lang="en-US" smtClean="0"/>
-              <a:t>4/7/2020</a:t>
+              <a:t>4/10/2020</a:t>
             </a:fld>
             <a:endParaRPr lang="en-US"/>
           </a:p>
@@ -2689,7 +2689,7 @@
           <a:p>
             <a:fld id="{FF1351A7-0CC0-49EE-969C-7FA0FB4B6599}" type="datetimeFigureOut">
               <a:rPr lang="en-US" smtClean="0"/>
-              <a:t>4/7/2020</a:t>
+              <a:t>4/10/2020</a:t>
             </a:fld>
             <a:endParaRPr lang="en-US"/>
           </a:p>
@@ -2932,7 +2932,7 @@
           <a:p>
             <a:fld id="{FF1351A7-0CC0-49EE-969C-7FA0FB4B6599}" type="datetimeFigureOut">
               <a:rPr lang="en-US" smtClean="0"/>
-              <a:t>4/7/2020</a:t>
+              <a:t>4/10/2020</a:t>
             </a:fld>
             <a:endParaRPr lang="en-US"/>
           </a:p>
@@ -8453,12 +8453,119 @@
           </p:txBody>
         </p:sp>
       </p:grpSp>
+      <p:sp>
+        <p:nvSpPr>
+          <p:cNvPr id="123" name="Textfeld 122">
+            <a:extLst>
+              <a:ext uri="{FF2B5EF4-FFF2-40B4-BE49-F238E27FC236}">
+                <a16:creationId xmlns:a16="http://schemas.microsoft.com/office/drawing/2014/main" id="{67A621AF-4FC0-4BFB-BC24-C9CEF68083E5}"/>
+              </a:ext>
+            </a:extLst>
+          </p:cNvPr>
+          <p:cNvSpPr txBox="1"/>
+          <p:nvPr/>
+        </p:nvSpPr>
+        <p:spPr>
+          <a:xfrm>
+            <a:off x="4101801" y="4087682"/>
+            <a:ext cx="615205" cy="369332"/>
+          </a:xfrm>
+          <a:prstGeom prst="rect">
+            <a:avLst/>
+          </a:prstGeom>
+          <a:noFill/>
+        </p:spPr>
+        <p:txBody>
+          <a:bodyPr wrap="square" rtlCol="0">
+            <a:spAutoFit/>
+          </a:bodyPr>
+          <a:lstStyle/>
+          <a:p>
+            <a:pPr algn="ctr"/>
+            <a:r>
+              <a:rPr lang="en-US" dirty="0">
+                <a:solidFill>
+                  <a:schemeClr val="bg1"/>
+                </a:solidFill>
+                <a:effectLst>
+                  <a:outerShdw blurRad="50800" dist="38100" dir="2700000" algn="tl" rotWithShape="0">
+                    <a:prstClr val="black">
+                      <a:alpha val="40000"/>
+                    </a:prstClr>
+                  </a:outerShdw>
+                </a:effectLst>
+                <a:latin typeface="Arial Black" panose="020B0A04020102020204" pitchFamily="34" charset="0"/>
+              </a:rPr>
+              <a:t>QA</a:t>
+            </a:r>
+          </a:p>
+        </p:txBody>
+      </p:sp>
+      <p:sp>
+        <p:nvSpPr>
+          <p:cNvPr id="8" name="Rechteck: abgerundete Ecken 7">
+            <a:extLst>
+              <a:ext uri="{FF2B5EF4-FFF2-40B4-BE49-F238E27FC236}">
+                <a16:creationId xmlns:a16="http://schemas.microsoft.com/office/drawing/2014/main" id="{B190B7D3-D06A-487F-AA1E-E9402DC0922D}"/>
+              </a:ext>
+            </a:extLst>
+          </p:cNvPr>
+          <p:cNvSpPr/>
+          <p:nvPr/>
+        </p:nvSpPr>
+        <p:spPr>
+          <a:xfrm>
+            <a:off x="4120085" y="4053667"/>
+            <a:ext cx="589302" cy="412775"/>
+          </a:xfrm>
+          <a:prstGeom prst="roundRect">
+            <a:avLst/>
+          </a:prstGeom>
+          <a:noFill/>
+          <a:ln w="28575">
+            <a:solidFill>
+              <a:schemeClr val="bg1"/>
+            </a:solidFill>
+          </a:ln>
+          <a:effectLst>
+            <a:outerShdw blurRad="50800" dist="38100" dir="2700000" algn="tl" rotWithShape="0">
+              <a:prstClr val="black">
+                <a:alpha val="40000"/>
+              </a:prstClr>
+            </a:outerShdw>
+          </a:effectLst>
+        </p:spPr>
+        <p:style>
+          <a:lnRef idx="2">
+            <a:schemeClr val="accent1">
+              <a:shade val="50000"/>
+            </a:schemeClr>
+          </a:lnRef>
+          <a:fillRef idx="1">
+            <a:schemeClr val="accent1"/>
+          </a:fillRef>
+          <a:effectRef idx="0">
+            <a:schemeClr val="accent1"/>
+          </a:effectRef>
+          <a:fontRef idx="minor">
+            <a:schemeClr val="lt1"/>
+          </a:fontRef>
+        </p:style>
+        <p:txBody>
+          <a:bodyPr rtlCol="0" anchor="ctr"/>
+          <a:lstStyle/>
+          <a:p>
+            <a:pPr algn="ctr"/>
+            <a:endParaRPr lang="en-US"/>
+          </a:p>
+        </p:txBody>
+      </p:sp>
       <p:grpSp>
         <p:nvGrpSpPr>
-          <p:cNvPr id="80" name="Gruppieren 79">
+          <p:cNvPr id="2" name="Gruppieren 1">
             <a:extLst>
               <a:ext uri="{FF2B5EF4-FFF2-40B4-BE49-F238E27FC236}">
-                <a16:creationId xmlns:a16="http://schemas.microsoft.com/office/drawing/2014/main" id="{13C0FCEB-A165-414F-AE3D-728288B3CAD0}"/>
+                <a16:creationId xmlns:a16="http://schemas.microsoft.com/office/drawing/2014/main" id="{F3D1BAC9-ED80-4649-A69F-39719599456B}"/>
               </a:ext>
             </a:extLst>
           </p:cNvPr>
@@ -8468,9 +8575,9 @@
         <p:grpSpPr>
           <a:xfrm>
             <a:off x="626450" y="5530285"/>
-            <a:ext cx="3225237" cy="1286303"/>
+            <a:ext cx="5658362" cy="1286303"/>
             <a:chOff x="626450" y="5530285"/>
-            <a:chExt cx="3225237" cy="1286303"/>
+            <a:chExt cx="5658362" cy="1286303"/>
           </a:xfrm>
         </p:grpSpPr>
         <p:sp>
@@ -8980,6 +9087,230 @@
             </a:p>
           </p:txBody>
         </p:sp>
+        <p:grpSp>
+          <p:nvGrpSpPr>
+            <p:cNvPr id="9" name="Gruppieren 8">
+              <a:extLst>
+                <a:ext uri="{FF2B5EF4-FFF2-40B4-BE49-F238E27FC236}">
+                  <a16:creationId xmlns:a16="http://schemas.microsoft.com/office/drawing/2014/main" id="{B0CFD5C7-B64A-47E8-8179-0EB53D8AD07C}"/>
+                </a:ext>
+              </a:extLst>
+            </p:cNvPr>
+            <p:cNvGrpSpPr/>
+            <p:nvPr/>
+          </p:nvGrpSpPr>
+          <p:grpSpPr>
+            <a:xfrm>
+              <a:off x="4117352" y="6471739"/>
+              <a:ext cx="2167460" cy="338554"/>
+              <a:chOff x="4637034" y="6042972"/>
+              <a:chExt cx="2167460" cy="338554"/>
+            </a:xfrm>
+          </p:grpSpPr>
+          <p:sp>
+            <p:nvSpPr>
+              <p:cNvPr id="126" name="Rechteck 125">
+                <a:extLst>
+                  <a:ext uri="{FF2B5EF4-FFF2-40B4-BE49-F238E27FC236}">
+                    <a16:creationId xmlns:a16="http://schemas.microsoft.com/office/drawing/2014/main" id="{2987C657-83E6-4F25-A334-D33F452E2562}"/>
+                  </a:ext>
+                </a:extLst>
+              </p:cNvPr>
+              <p:cNvSpPr/>
+              <p:nvPr/>
+            </p:nvSpPr>
+            <p:spPr>
+              <a:xfrm>
+                <a:off x="4657120" y="6082504"/>
+                <a:ext cx="387320" cy="259490"/>
+              </a:xfrm>
+              <a:prstGeom prst="rect">
+                <a:avLst/>
+              </a:prstGeom>
+              <a:solidFill>
+                <a:schemeClr val="bg2">
+                  <a:lumMod val="10000"/>
+                  <a:alpha val="50000"/>
+                </a:schemeClr>
+              </a:solidFill>
+              <a:ln>
+                <a:noFill/>
+              </a:ln>
+            </p:spPr>
+            <p:style>
+              <a:lnRef idx="2">
+                <a:schemeClr val="accent1">
+                  <a:shade val="50000"/>
+                </a:schemeClr>
+              </a:lnRef>
+              <a:fillRef idx="1">
+                <a:schemeClr val="accent1"/>
+              </a:fillRef>
+              <a:effectRef idx="0">
+                <a:schemeClr val="accent1"/>
+              </a:effectRef>
+              <a:fontRef idx="minor">
+                <a:schemeClr val="lt1"/>
+              </a:fontRef>
+            </p:style>
+            <p:txBody>
+              <a:bodyPr rtlCol="0" anchor="ctr"/>
+              <a:lstStyle/>
+              <a:p>
+                <a:pPr algn="ctr"/>
+                <a:endParaRPr lang="en-US"/>
+              </a:p>
+            </p:txBody>
+          </p:sp>
+          <p:sp>
+            <p:nvSpPr>
+              <p:cNvPr id="127" name="Textfeld 126">
+                <a:extLst>
+                  <a:ext uri="{FF2B5EF4-FFF2-40B4-BE49-F238E27FC236}">
+                    <a16:creationId xmlns:a16="http://schemas.microsoft.com/office/drawing/2014/main" id="{B9D53540-8FB6-4EF6-AE5D-3B19412EE54E}"/>
+                  </a:ext>
+                </a:extLst>
+              </p:cNvPr>
+              <p:cNvSpPr txBox="1"/>
+              <p:nvPr/>
+            </p:nvSpPr>
+            <p:spPr>
+              <a:xfrm>
+                <a:off x="4637034" y="6082504"/>
+                <a:ext cx="425186" cy="261610"/>
+              </a:xfrm>
+              <a:prstGeom prst="rect">
+                <a:avLst/>
+              </a:prstGeom>
+              <a:noFill/>
+            </p:spPr>
+            <p:txBody>
+              <a:bodyPr wrap="square" rtlCol="0">
+                <a:spAutoFit/>
+              </a:bodyPr>
+              <a:lstStyle/>
+              <a:p>
+                <a:pPr algn="ctr"/>
+                <a:r>
+                  <a:rPr lang="en-US" sz="1100" dirty="0">
+                    <a:solidFill>
+                      <a:schemeClr val="bg1"/>
+                    </a:solidFill>
+                    <a:effectLst>
+                      <a:outerShdw blurRad="50800" dist="38100" dir="2700000" algn="tl" rotWithShape="0">
+                        <a:prstClr val="black">
+                          <a:alpha val="40000"/>
+                        </a:prstClr>
+                      </a:outerShdw>
+                    </a:effectLst>
+                    <a:latin typeface="Arial Black" panose="020B0A04020102020204" pitchFamily="34" charset="0"/>
+                  </a:rPr>
+                  <a:t>QA</a:t>
+                </a:r>
+              </a:p>
+            </p:txBody>
+          </p:sp>
+          <p:sp>
+            <p:nvSpPr>
+              <p:cNvPr id="128" name="Rechteck: abgerundete Ecken 127">
+                <a:extLst>
+                  <a:ext uri="{FF2B5EF4-FFF2-40B4-BE49-F238E27FC236}">
+                    <a16:creationId xmlns:a16="http://schemas.microsoft.com/office/drawing/2014/main" id="{38A20DDE-7EE4-4D46-B417-9E169B57D310}"/>
+                  </a:ext>
+                </a:extLst>
+              </p:cNvPr>
+              <p:cNvSpPr/>
+              <p:nvPr/>
+            </p:nvSpPr>
+            <p:spPr>
+              <a:xfrm>
+                <a:off x="4706249" y="6130290"/>
+                <a:ext cx="294376" cy="163918"/>
+              </a:xfrm>
+              <a:prstGeom prst="roundRect">
+                <a:avLst/>
+              </a:prstGeom>
+              <a:noFill/>
+              <a:ln w="12700">
+                <a:solidFill>
+                  <a:schemeClr val="bg1"/>
+                </a:solidFill>
+              </a:ln>
+              <a:effectLst>
+                <a:outerShdw blurRad="50800" dist="38100" dir="2700000" algn="tl" rotWithShape="0">
+                  <a:prstClr val="black">
+                    <a:alpha val="40000"/>
+                  </a:prstClr>
+                </a:outerShdw>
+              </a:effectLst>
+            </p:spPr>
+            <p:style>
+              <a:lnRef idx="2">
+                <a:schemeClr val="accent1">
+                  <a:shade val="50000"/>
+                </a:schemeClr>
+              </a:lnRef>
+              <a:fillRef idx="1">
+                <a:schemeClr val="accent1"/>
+              </a:fillRef>
+              <a:effectRef idx="0">
+                <a:schemeClr val="accent1"/>
+              </a:effectRef>
+              <a:fontRef idx="minor">
+                <a:schemeClr val="lt1"/>
+              </a:fontRef>
+            </p:style>
+            <p:txBody>
+              <a:bodyPr rtlCol="0" anchor="ctr"/>
+              <a:lstStyle/>
+              <a:p>
+                <a:pPr algn="ctr"/>
+                <a:endParaRPr lang="en-US"/>
+              </a:p>
+            </p:txBody>
+          </p:sp>
+          <p:sp>
+            <p:nvSpPr>
+              <p:cNvPr id="129" name="Textfeld 128">
+                <a:extLst>
+                  <a:ext uri="{FF2B5EF4-FFF2-40B4-BE49-F238E27FC236}">
+                    <a16:creationId xmlns:a16="http://schemas.microsoft.com/office/drawing/2014/main" id="{00799B51-9C11-45BB-8ECD-53E1182B8F83}"/>
+                  </a:ext>
+                </a:extLst>
+              </p:cNvPr>
+              <p:cNvSpPr txBox="1"/>
+              <p:nvPr/>
+            </p:nvSpPr>
+            <p:spPr>
+              <a:xfrm>
+                <a:off x="5649987" y="6042972"/>
+                <a:ext cx="1154507" cy="338554"/>
+              </a:xfrm>
+              <a:prstGeom prst="rect">
+                <a:avLst/>
+              </a:prstGeom>
+              <a:noFill/>
+            </p:spPr>
+            <p:txBody>
+              <a:bodyPr wrap="square" rtlCol="0">
+                <a:spAutoFit/>
+              </a:bodyPr>
+              <a:lstStyle/>
+              <a:p>
+                <a:r>
+                  <a:rPr lang="en-US" sz="1600" dirty="0">
+                    <a:solidFill>
+                      <a:schemeClr val="bg2">
+                        <a:lumMod val="50000"/>
+                      </a:schemeClr>
+                    </a:solidFill>
+                  </a:rPr>
+                  <a:t>Playtesting</a:t>
+                </a:r>
+              </a:p>
+            </p:txBody>
+          </p:sp>
+        </p:grpSp>
       </p:grpSp>
     </p:spTree>
     <p:extLst>
@@ -13086,10 +13417,10 @@
       </p:grpSp>
       <p:grpSp>
         <p:nvGrpSpPr>
-          <p:cNvPr id="46" name="Gruppieren 45">
+          <p:cNvPr id="58" name="Gruppieren 57">
             <a:extLst>
               <a:ext uri="{FF2B5EF4-FFF2-40B4-BE49-F238E27FC236}">
-                <a16:creationId xmlns:a16="http://schemas.microsoft.com/office/drawing/2014/main" id="{586B4BA2-FECF-40FC-AADF-79CD1D659821}"/>
+                <a16:creationId xmlns:a16="http://schemas.microsoft.com/office/drawing/2014/main" id="{F2D17D4E-25A8-4C8E-955E-9309B070D1CD}"/>
               </a:ext>
             </a:extLst>
           </p:cNvPr>
@@ -13099,17 +13430,17 @@
         <p:grpSpPr>
           <a:xfrm>
             <a:off x="626450" y="5530285"/>
-            <a:ext cx="3225237" cy="1286303"/>
+            <a:ext cx="5658362" cy="1286303"/>
             <a:chOff x="626450" y="5530285"/>
-            <a:chExt cx="3225237" cy="1286303"/>
+            <a:chExt cx="5658362" cy="1286303"/>
           </a:xfrm>
         </p:grpSpPr>
         <p:sp>
           <p:nvSpPr>
-            <p:cNvPr id="47" name="Rechteck 46">
+            <p:cNvPr id="59" name="Rechteck 58">
               <a:extLst>
                 <a:ext uri="{FF2B5EF4-FFF2-40B4-BE49-F238E27FC236}">
-                  <a16:creationId xmlns:a16="http://schemas.microsoft.com/office/drawing/2014/main" id="{D4E058DA-7EEC-40FD-BFC3-37779A494F2F}"/>
+                  <a16:creationId xmlns:a16="http://schemas.microsoft.com/office/drawing/2014/main" id="{0794E8B1-7728-4470-A2A8-4A7186312F80}"/>
                 </a:ext>
               </a:extLst>
             </p:cNvPr>
@@ -13160,10 +13491,10 @@
         </p:sp>
         <p:sp>
           <p:nvSpPr>
-            <p:cNvPr id="48" name="Rechteck 47">
+            <p:cNvPr id="60" name="Rechteck 59">
               <a:extLst>
                 <a:ext uri="{FF2B5EF4-FFF2-40B4-BE49-F238E27FC236}">
-                  <a16:creationId xmlns:a16="http://schemas.microsoft.com/office/drawing/2014/main" id="{A861AAAB-AD1F-44BE-B10F-2AAD7C7565C0}"/>
+                  <a16:creationId xmlns:a16="http://schemas.microsoft.com/office/drawing/2014/main" id="{C8EB371C-782F-4418-90A9-4A8D83A3DB24}"/>
                 </a:ext>
               </a:extLst>
             </p:cNvPr>
@@ -13214,10 +13545,10 @@
         </p:sp>
         <p:sp>
           <p:nvSpPr>
-            <p:cNvPr id="49" name="Rechteck 48">
+            <p:cNvPr id="61" name="Rechteck 60">
               <a:extLst>
                 <a:ext uri="{FF2B5EF4-FFF2-40B4-BE49-F238E27FC236}">
-                  <a16:creationId xmlns:a16="http://schemas.microsoft.com/office/drawing/2014/main" id="{DF462AD7-3FB5-4324-87C1-6796E467E396}"/>
+                  <a16:creationId xmlns:a16="http://schemas.microsoft.com/office/drawing/2014/main" id="{ADA371B6-81E7-4D31-BBFC-032073FB393F}"/>
                 </a:ext>
               </a:extLst>
             </p:cNvPr>
@@ -13269,10 +13600,10 @@
         </p:sp>
         <p:sp>
           <p:nvSpPr>
-            <p:cNvPr id="50" name="Rechteck 49">
+            <p:cNvPr id="62" name="Rechteck 61">
               <a:extLst>
                 <a:ext uri="{FF2B5EF4-FFF2-40B4-BE49-F238E27FC236}">
-                  <a16:creationId xmlns:a16="http://schemas.microsoft.com/office/drawing/2014/main" id="{84A64EBE-6A8B-4CA8-B105-472DA952EA07}"/>
+                  <a16:creationId xmlns:a16="http://schemas.microsoft.com/office/drawing/2014/main" id="{56D517EE-2C43-4BF9-88F8-BEE66435AE81}"/>
                 </a:ext>
               </a:extLst>
             </p:cNvPr>
@@ -13325,10 +13656,10 @@
         </p:sp>
         <p:grpSp>
           <p:nvGrpSpPr>
-            <p:cNvPr id="51" name="Gruppieren 50">
+            <p:cNvPr id="63" name="Gruppieren 62">
               <a:extLst>
                 <a:ext uri="{FF2B5EF4-FFF2-40B4-BE49-F238E27FC236}">
-                  <a16:creationId xmlns:a16="http://schemas.microsoft.com/office/drawing/2014/main" id="{F7E5684D-F2D1-4B4E-B827-AC4CB62F03D3}"/>
+                  <a16:creationId xmlns:a16="http://schemas.microsoft.com/office/drawing/2014/main" id="{511791F8-4652-42A8-8231-F5CA9A510829}"/>
                 </a:ext>
               </a:extLst>
             </p:cNvPr>
@@ -13345,10 +13676,10 @@
           </p:grpSpPr>
           <p:sp>
             <p:nvSpPr>
-              <p:cNvPr id="56" name="Rechteck 55">
+              <p:cNvPr id="73" name="Rechteck 72">
                 <a:extLst>
                   <a:ext uri="{FF2B5EF4-FFF2-40B4-BE49-F238E27FC236}">
-                    <a16:creationId xmlns:a16="http://schemas.microsoft.com/office/drawing/2014/main" id="{4CF6CFD2-DAA9-4901-872B-1D69F230E810}"/>
+                    <a16:creationId xmlns:a16="http://schemas.microsoft.com/office/drawing/2014/main" id="{B087D143-3E23-41F5-8BE2-FAB6D3B81BA7}"/>
                   </a:ext>
                 </a:extLst>
               </p:cNvPr>
@@ -13400,10 +13731,10 @@
           </p:sp>
           <p:sp>
             <p:nvSpPr>
-              <p:cNvPr id="57" name="Textfeld 56">
+              <p:cNvPr id="74" name="Textfeld 73">
                 <a:extLst>
                   <a:ext uri="{FF2B5EF4-FFF2-40B4-BE49-F238E27FC236}">
-                    <a16:creationId xmlns:a16="http://schemas.microsoft.com/office/drawing/2014/main" id="{F90FE8C4-11CB-49D9-AB4A-4210BC3D4AEC}"/>
+                    <a16:creationId xmlns:a16="http://schemas.microsoft.com/office/drawing/2014/main" id="{CEEFFC24-63FB-4307-8E90-B445D673EE93}"/>
                   </a:ext>
                 </a:extLst>
               </p:cNvPr>
@@ -13449,10 +13780,10 @@
         </p:grpSp>
         <p:sp>
           <p:nvSpPr>
-            <p:cNvPr id="52" name="Textfeld 51">
+            <p:cNvPr id="64" name="Textfeld 63">
               <a:extLst>
                 <a:ext uri="{FF2B5EF4-FFF2-40B4-BE49-F238E27FC236}">
-                  <a16:creationId xmlns:a16="http://schemas.microsoft.com/office/drawing/2014/main" id="{0A631D6B-9399-4438-9AA9-635AA0E393F4}"/>
+                  <a16:creationId xmlns:a16="http://schemas.microsoft.com/office/drawing/2014/main" id="{4738791D-7F5D-4826-B9F5-CE84E18ADC5F}"/>
                 </a:ext>
               </a:extLst>
             </p:cNvPr>
@@ -13490,10 +13821,10 @@
         </p:sp>
         <p:sp>
           <p:nvSpPr>
-            <p:cNvPr id="53" name="Textfeld 52">
+            <p:cNvPr id="65" name="Textfeld 64">
               <a:extLst>
                 <a:ext uri="{FF2B5EF4-FFF2-40B4-BE49-F238E27FC236}">
-                  <a16:creationId xmlns:a16="http://schemas.microsoft.com/office/drawing/2014/main" id="{48366389-3A4A-4A5E-AF0C-5FF21341A9F5}"/>
+                  <a16:creationId xmlns:a16="http://schemas.microsoft.com/office/drawing/2014/main" id="{8E84CF13-71B8-450F-B4CC-612CE00BD471}"/>
                 </a:ext>
               </a:extLst>
             </p:cNvPr>
@@ -13531,10 +13862,10 @@
         </p:sp>
         <p:sp>
           <p:nvSpPr>
-            <p:cNvPr id="54" name="Textfeld 53">
+            <p:cNvPr id="66" name="Textfeld 65">
               <a:extLst>
                 <a:ext uri="{FF2B5EF4-FFF2-40B4-BE49-F238E27FC236}">
-                  <a16:creationId xmlns:a16="http://schemas.microsoft.com/office/drawing/2014/main" id="{0707D878-67C2-49DC-B31E-E9316222CC4E}"/>
+                  <a16:creationId xmlns:a16="http://schemas.microsoft.com/office/drawing/2014/main" id="{17DCABAF-A38C-4C63-A7A0-33F9FFCE9D6D}"/>
                 </a:ext>
               </a:extLst>
             </p:cNvPr>
@@ -13572,10 +13903,10 @@
         </p:sp>
         <p:sp>
           <p:nvSpPr>
-            <p:cNvPr id="55" name="Textfeld 54">
+            <p:cNvPr id="67" name="Textfeld 66">
               <a:extLst>
                 <a:ext uri="{FF2B5EF4-FFF2-40B4-BE49-F238E27FC236}">
-                  <a16:creationId xmlns:a16="http://schemas.microsoft.com/office/drawing/2014/main" id="{471CC6E9-0ECF-4E8A-B100-EEFE0429B070}"/>
+                  <a16:creationId xmlns:a16="http://schemas.microsoft.com/office/drawing/2014/main" id="{4F208E41-9C76-42B3-988B-4460C3681577}"/>
                 </a:ext>
               </a:extLst>
             </p:cNvPr>
@@ -13611,6 +13942,230 @@
             </a:p>
           </p:txBody>
         </p:sp>
+        <p:grpSp>
+          <p:nvGrpSpPr>
+            <p:cNvPr id="68" name="Gruppieren 67">
+              <a:extLst>
+                <a:ext uri="{FF2B5EF4-FFF2-40B4-BE49-F238E27FC236}">
+                  <a16:creationId xmlns:a16="http://schemas.microsoft.com/office/drawing/2014/main" id="{E1A70366-EEFE-494C-AF36-6D59D7CBB0B7}"/>
+                </a:ext>
+              </a:extLst>
+            </p:cNvPr>
+            <p:cNvGrpSpPr/>
+            <p:nvPr/>
+          </p:nvGrpSpPr>
+          <p:grpSpPr>
+            <a:xfrm>
+              <a:off x="4117352" y="6471739"/>
+              <a:ext cx="2167460" cy="338554"/>
+              <a:chOff x="4637034" y="6042972"/>
+              <a:chExt cx="2167460" cy="338554"/>
+            </a:xfrm>
+          </p:grpSpPr>
+          <p:sp>
+            <p:nvSpPr>
+              <p:cNvPr id="69" name="Rechteck 68">
+                <a:extLst>
+                  <a:ext uri="{FF2B5EF4-FFF2-40B4-BE49-F238E27FC236}">
+                    <a16:creationId xmlns:a16="http://schemas.microsoft.com/office/drawing/2014/main" id="{9F08FED1-ED34-4BB9-ACAA-242262442E15}"/>
+                  </a:ext>
+                </a:extLst>
+              </p:cNvPr>
+              <p:cNvSpPr/>
+              <p:nvPr/>
+            </p:nvSpPr>
+            <p:spPr>
+              <a:xfrm>
+                <a:off x="4657120" y="6082504"/>
+                <a:ext cx="387320" cy="259490"/>
+              </a:xfrm>
+              <a:prstGeom prst="rect">
+                <a:avLst/>
+              </a:prstGeom>
+              <a:solidFill>
+                <a:schemeClr val="bg2">
+                  <a:lumMod val="10000"/>
+                  <a:alpha val="50000"/>
+                </a:schemeClr>
+              </a:solidFill>
+              <a:ln>
+                <a:noFill/>
+              </a:ln>
+            </p:spPr>
+            <p:style>
+              <a:lnRef idx="2">
+                <a:schemeClr val="accent1">
+                  <a:shade val="50000"/>
+                </a:schemeClr>
+              </a:lnRef>
+              <a:fillRef idx="1">
+                <a:schemeClr val="accent1"/>
+              </a:fillRef>
+              <a:effectRef idx="0">
+                <a:schemeClr val="accent1"/>
+              </a:effectRef>
+              <a:fontRef idx="minor">
+                <a:schemeClr val="lt1"/>
+              </a:fontRef>
+            </p:style>
+            <p:txBody>
+              <a:bodyPr rtlCol="0" anchor="ctr"/>
+              <a:lstStyle/>
+              <a:p>
+                <a:pPr algn="ctr"/>
+                <a:endParaRPr lang="en-US"/>
+              </a:p>
+            </p:txBody>
+          </p:sp>
+          <p:sp>
+            <p:nvSpPr>
+              <p:cNvPr id="70" name="Textfeld 69">
+                <a:extLst>
+                  <a:ext uri="{FF2B5EF4-FFF2-40B4-BE49-F238E27FC236}">
+                    <a16:creationId xmlns:a16="http://schemas.microsoft.com/office/drawing/2014/main" id="{D8A75F1A-ABCC-480F-AB3F-CCAACA3C7DED}"/>
+                  </a:ext>
+                </a:extLst>
+              </p:cNvPr>
+              <p:cNvSpPr txBox="1"/>
+              <p:nvPr/>
+            </p:nvSpPr>
+            <p:spPr>
+              <a:xfrm>
+                <a:off x="4637034" y="6082504"/>
+                <a:ext cx="425186" cy="261610"/>
+              </a:xfrm>
+              <a:prstGeom prst="rect">
+                <a:avLst/>
+              </a:prstGeom>
+              <a:noFill/>
+            </p:spPr>
+            <p:txBody>
+              <a:bodyPr wrap="square" rtlCol="0">
+                <a:spAutoFit/>
+              </a:bodyPr>
+              <a:lstStyle/>
+              <a:p>
+                <a:pPr algn="ctr"/>
+                <a:r>
+                  <a:rPr lang="en-US" sz="1100" dirty="0">
+                    <a:solidFill>
+                      <a:schemeClr val="bg1"/>
+                    </a:solidFill>
+                    <a:effectLst>
+                      <a:outerShdw blurRad="50800" dist="38100" dir="2700000" algn="tl" rotWithShape="0">
+                        <a:prstClr val="black">
+                          <a:alpha val="40000"/>
+                        </a:prstClr>
+                      </a:outerShdw>
+                    </a:effectLst>
+                    <a:latin typeface="Arial Black" panose="020B0A04020102020204" pitchFamily="34" charset="0"/>
+                  </a:rPr>
+                  <a:t>QA</a:t>
+                </a:r>
+              </a:p>
+            </p:txBody>
+          </p:sp>
+          <p:sp>
+            <p:nvSpPr>
+              <p:cNvPr id="71" name="Rechteck: abgerundete Ecken 70">
+                <a:extLst>
+                  <a:ext uri="{FF2B5EF4-FFF2-40B4-BE49-F238E27FC236}">
+                    <a16:creationId xmlns:a16="http://schemas.microsoft.com/office/drawing/2014/main" id="{0041470B-A0C5-42A9-B9B9-43F7AA239AA7}"/>
+                  </a:ext>
+                </a:extLst>
+              </p:cNvPr>
+              <p:cNvSpPr/>
+              <p:nvPr/>
+            </p:nvSpPr>
+            <p:spPr>
+              <a:xfrm>
+                <a:off x="4706249" y="6130290"/>
+                <a:ext cx="294376" cy="163918"/>
+              </a:xfrm>
+              <a:prstGeom prst="roundRect">
+                <a:avLst/>
+              </a:prstGeom>
+              <a:noFill/>
+              <a:ln w="12700">
+                <a:solidFill>
+                  <a:schemeClr val="bg1"/>
+                </a:solidFill>
+              </a:ln>
+              <a:effectLst>
+                <a:outerShdw blurRad="50800" dist="38100" dir="2700000" algn="tl" rotWithShape="0">
+                  <a:prstClr val="black">
+                    <a:alpha val="40000"/>
+                  </a:prstClr>
+                </a:outerShdw>
+              </a:effectLst>
+            </p:spPr>
+            <p:style>
+              <a:lnRef idx="2">
+                <a:schemeClr val="accent1">
+                  <a:shade val="50000"/>
+                </a:schemeClr>
+              </a:lnRef>
+              <a:fillRef idx="1">
+                <a:schemeClr val="accent1"/>
+              </a:fillRef>
+              <a:effectRef idx="0">
+                <a:schemeClr val="accent1"/>
+              </a:effectRef>
+              <a:fontRef idx="minor">
+                <a:schemeClr val="lt1"/>
+              </a:fontRef>
+            </p:style>
+            <p:txBody>
+              <a:bodyPr rtlCol="0" anchor="ctr"/>
+              <a:lstStyle/>
+              <a:p>
+                <a:pPr algn="ctr"/>
+                <a:endParaRPr lang="en-US"/>
+              </a:p>
+            </p:txBody>
+          </p:sp>
+          <p:sp>
+            <p:nvSpPr>
+              <p:cNvPr id="72" name="Textfeld 71">
+                <a:extLst>
+                  <a:ext uri="{FF2B5EF4-FFF2-40B4-BE49-F238E27FC236}">
+                    <a16:creationId xmlns:a16="http://schemas.microsoft.com/office/drawing/2014/main" id="{BCD66069-2E3A-4909-888B-7139C80ECBED}"/>
+                  </a:ext>
+                </a:extLst>
+              </p:cNvPr>
+              <p:cNvSpPr txBox="1"/>
+              <p:nvPr/>
+            </p:nvSpPr>
+            <p:spPr>
+              <a:xfrm>
+                <a:off x="5649987" y="6042972"/>
+                <a:ext cx="1154507" cy="338554"/>
+              </a:xfrm>
+              <a:prstGeom prst="rect">
+                <a:avLst/>
+              </a:prstGeom>
+              <a:noFill/>
+            </p:spPr>
+            <p:txBody>
+              <a:bodyPr wrap="square" rtlCol="0">
+                <a:spAutoFit/>
+              </a:bodyPr>
+              <a:lstStyle/>
+              <a:p>
+                <a:r>
+                  <a:rPr lang="en-US" sz="1600" dirty="0">
+                    <a:solidFill>
+                      <a:schemeClr val="bg2">
+                        <a:lumMod val="50000"/>
+                      </a:schemeClr>
+                    </a:solidFill>
+                  </a:rPr>
+                  <a:t>Playtesting</a:t>
+                </a:r>
+              </a:p>
+            </p:txBody>
+          </p:sp>
+        </p:grpSp>
       </p:grpSp>
     </p:spTree>
     <p:extLst>

</xml_diff>